<commit_message>
update link in presentation
</commit_message>
<xml_diff>
--- a/physical-activity-classification-LogisticReg/presentation.pptx
+++ b/physical-activity-classification-LogisticReg/presentation.pptx
@@ -270,7 +270,7 @@
           <a:p>
             <a:fld id="{06E2C68C-7A9B-4030-BF64-F651752AC887}" type="datetimeFigureOut">
               <a:rPr lang="ru-RU" smtClean="0"/>
-              <a:t>27.02.2025</a:t>
+              <a:t>01.03.2025</a:t>
             </a:fld>
             <a:endParaRPr lang="ru-RU"/>
           </a:p>
@@ -468,7 +468,7 @@
           <a:p>
             <a:fld id="{06E2C68C-7A9B-4030-BF64-F651752AC887}" type="datetimeFigureOut">
               <a:rPr lang="ru-RU" smtClean="0"/>
-              <a:t>27.02.2025</a:t>
+              <a:t>01.03.2025</a:t>
             </a:fld>
             <a:endParaRPr lang="ru-RU"/>
           </a:p>
@@ -676,7 +676,7 @@
           <a:p>
             <a:fld id="{06E2C68C-7A9B-4030-BF64-F651752AC887}" type="datetimeFigureOut">
               <a:rPr lang="ru-RU" smtClean="0"/>
-              <a:t>27.02.2025</a:t>
+              <a:t>01.03.2025</a:t>
             </a:fld>
             <a:endParaRPr lang="ru-RU"/>
           </a:p>
@@ -874,7 +874,7 @@
           <a:p>
             <a:fld id="{06E2C68C-7A9B-4030-BF64-F651752AC887}" type="datetimeFigureOut">
               <a:rPr lang="ru-RU" smtClean="0"/>
-              <a:t>27.02.2025</a:t>
+              <a:t>01.03.2025</a:t>
             </a:fld>
             <a:endParaRPr lang="ru-RU"/>
           </a:p>
@@ -1149,7 +1149,7 @@
           <a:p>
             <a:fld id="{06E2C68C-7A9B-4030-BF64-F651752AC887}" type="datetimeFigureOut">
               <a:rPr lang="ru-RU" smtClean="0"/>
-              <a:t>27.02.2025</a:t>
+              <a:t>01.03.2025</a:t>
             </a:fld>
             <a:endParaRPr lang="ru-RU"/>
           </a:p>
@@ -1414,7 +1414,7 @@
           <a:p>
             <a:fld id="{06E2C68C-7A9B-4030-BF64-F651752AC887}" type="datetimeFigureOut">
               <a:rPr lang="ru-RU" smtClean="0"/>
-              <a:t>27.02.2025</a:t>
+              <a:t>01.03.2025</a:t>
             </a:fld>
             <a:endParaRPr lang="ru-RU"/>
           </a:p>
@@ -1826,7 +1826,7 @@
           <a:p>
             <a:fld id="{06E2C68C-7A9B-4030-BF64-F651752AC887}" type="datetimeFigureOut">
               <a:rPr lang="ru-RU" smtClean="0"/>
-              <a:t>27.02.2025</a:t>
+              <a:t>01.03.2025</a:t>
             </a:fld>
             <a:endParaRPr lang="ru-RU"/>
           </a:p>
@@ -1967,7 +1967,7 @@
           <a:p>
             <a:fld id="{06E2C68C-7A9B-4030-BF64-F651752AC887}" type="datetimeFigureOut">
               <a:rPr lang="ru-RU" smtClean="0"/>
-              <a:t>27.02.2025</a:t>
+              <a:t>01.03.2025</a:t>
             </a:fld>
             <a:endParaRPr lang="ru-RU"/>
           </a:p>
@@ -2080,7 +2080,7 @@
           <a:p>
             <a:fld id="{06E2C68C-7A9B-4030-BF64-F651752AC887}" type="datetimeFigureOut">
               <a:rPr lang="ru-RU" smtClean="0"/>
-              <a:t>27.02.2025</a:t>
+              <a:t>01.03.2025</a:t>
             </a:fld>
             <a:endParaRPr lang="ru-RU"/>
           </a:p>
@@ -2391,7 +2391,7 @@
           <a:p>
             <a:fld id="{06E2C68C-7A9B-4030-BF64-F651752AC887}" type="datetimeFigureOut">
               <a:rPr lang="ru-RU" smtClean="0"/>
-              <a:t>27.02.2025</a:t>
+              <a:t>01.03.2025</a:t>
             </a:fld>
             <a:endParaRPr lang="ru-RU"/>
           </a:p>
@@ -2679,7 +2679,7 @@
           <a:p>
             <a:fld id="{06E2C68C-7A9B-4030-BF64-F651752AC887}" type="datetimeFigureOut">
               <a:rPr lang="ru-RU" smtClean="0"/>
-              <a:t>27.02.2025</a:t>
+              <a:t>01.03.2025</a:t>
             </a:fld>
             <a:endParaRPr lang="ru-RU"/>
           </a:p>
@@ -2920,7 +2920,7 @@
           <a:p>
             <a:fld id="{06E2C68C-7A9B-4030-BF64-F651752AC887}" type="datetimeFigureOut">
               <a:rPr lang="ru-RU" smtClean="0"/>
-              <a:t>27.02.2025</a:t>
+              <a:t>01.03.2025</a:t>
             </a:fld>
             <a:endParaRPr lang="ru-RU"/>
           </a:p>
@@ -4290,7 +4290,7 @@
         </p:spPr>
         <p:txBody>
           <a:bodyPr>
-            <a:normAutofit fontScale="55000" lnSpcReduction="20000"/>
+            <a:normAutofit fontScale="70000" lnSpcReduction="20000"/>
           </a:bodyPr>
           <a:lstStyle/>
           <a:p>
@@ -4298,28 +4298,35 @@
               <a:buNone/>
             </a:pPr>
             <a:r>
-              <a:rPr lang="en-US" sz="6000" b="1" dirty="0">
-                <a:solidFill>
-                  <a:schemeClr val="accent1"/>
-                </a:solidFill>
-                <a:latin typeface="Times New Roman" panose="02020603050405020304" pitchFamily="18" charset="0"/>
-                <a:cs typeface="Times New Roman" panose="02020603050405020304" pitchFamily="18" charset="0"/>
-                <a:hlinkClick r:id="rId4">
-                  <a:extLst>
-                    <a:ext uri="{A12FA001-AC4F-418D-AE19-62706E023703}">
-                      <ahyp:hlinkClr xmlns:ahyp="http://schemas.microsoft.com/office/drawing/2018/hyperlinkcolor" val="tx"/>
-                    </a:ext>
-                  </a:extLst>
-                </a:hlinkClick>
+              <a:rPr lang="en-US" sz="4400" b="0" i="0" dirty="0">
+                <a:solidFill>
+                  <a:srgbClr val="000000"/>
+                </a:solidFill>
+                <a:effectLst/>
+                <a:latin typeface="-apple-system"/>
+                <a:hlinkClick r:id="rId4"/>
               </a:rPr>
-              <a:t>https://datasphere.yandex.ru/communities/bt1ajg8jg700f4dkdlco/projects/bt1et24g999lkmla8m5g/jupyterlab</a:t>
-            </a:r>
-            <a:endParaRPr lang="ru-RU" sz="6000" b="1" dirty="0">
+              <a:t>https://github.com/afrlfff/ml-projects/tree/main/physical-activity-classification-LogisticReg</a:t>
+            </a:r>
+            <a:endParaRPr lang="ru-RU" sz="6000" b="1" i="0" dirty="0">
               <a:solidFill>
                 <a:schemeClr val="accent1"/>
               </a:solidFill>
+              <a:effectLst/>
               <a:latin typeface="Times New Roman" panose="02020603050405020304" pitchFamily="18" charset="0"/>
               <a:cs typeface="Times New Roman" panose="02020603050405020304" pitchFamily="18" charset="0"/>
+            </a:endParaRPr>
+          </a:p>
+          <a:p>
+            <a:pPr marL="0" indent="446088">
+              <a:buNone/>
+            </a:pPr>
+            <a:endParaRPr lang="ru-RU" sz="4400" b="0" i="0" dirty="0">
+              <a:solidFill>
+                <a:srgbClr val="000000"/>
+              </a:solidFill>
+              <a:effectLst/>
+              <a:latin typeface="-apple-system"/>
             </a:endParaRPr>
           </a:p>
         </p:txBody>

</xml_diff>